<commit_message>
rename TextAlignment -> TextHorizontalAlignment, Add test for vertical alignment
</commit_message>
<xml_diff>
--- a/test/ShapeCrawler.Tests.Unit/Assets/014.pptx
+++ b/test/ShapeCrawler.Tests.Unit/Assets/014.pptx
@@ -831,8 +831,8 @@
         </p:nvSpPr>
         <p:spPr>
           <a:xfrm>
-            <a:off x="746125" y="739775"/>
-            <a:ext cx="5226050" cy="3695700"/>
+            <a:off x="74613" y="739775"/>
+            <a:ext cx="6569075" cy="3695700"/>
           </a:xfrm>
         </p:spPr>
       </p:sp>
@@ -3756,7 +3756,7 @@
           </a:ln>
           <a:extLst>
             <a:ext uri="{C572A759-6A51-4108-AA02-DFA0A04FC94B}">
-              <ma14:wrappingTextBoxFlag xmlns="" xmlns:ma14="http://schemas.microsoft.com/office/mac/drawingml/2011/main" val="1"/>
+              <ma14:wrappingTextBoxFlag xmlns:ma14="http://schemas.microsoft.com/office/mac/drawingml/2011/main" xmlns="" val="1"/>
             </a:ext>
           </a:extLst>
         </p:spPr>
@@ -5593,7 +5593,7 @@
           </p:cNvGraphicFramePr>
           <p:nvPr userDrawn="1">
             <p:custDataLst>
-              <p:tags r:id="rId4"/>
+              <p:tags r:id="rId3"/>
             </p:custDataLst>
             <p:extLst>
               <p:ext uri="{D42A27DB-BD31-4B8C-83A1-F6EECF244321}">
@@ -5610,12 +5610,12 @@
           <a:graphicData uri="http://schemas.openxmlformats.org/presentationml/2006/ole">
             <mc:AlternateContent xmlns:mc="http://schemas.openxmlformats.org/markup-compatibility/2006">
               <mc:Choice xmlns:v="urn:schemas-microsoft-com:vml" Requires="v">
-                <p:oleObj spid="_x0000_s1033" name="think-cell Slide" r:id="rId6" imgW="395" imgH="396" progId="TCLayout.ActiveDocument.1">
+                <p:oleObj name="think-cell Slide" r:id="rId5" imgW="395" imgH="396" progId="TCLayout.ActiveDocument.1">
                   <p:embed/>
                 </p:oleObj>
               </mc:Choice>
               <mc:Fallback>
-                <p:oleObj name="think-cell Slide" r:id="rId6" imgW="395" imgH="396" progId="TCLayout.ActiveDocument.1">
+                <p:oleObj name="think-cell Slide" r:id="rId5" imgW="395" imgH="396" progId="TCLayout.ActiveDocument.1">
                   <p:embed/>
                   <p:pic>
                     <p:nvPicPr>
@@ -5630,7 +5630,7 @@
                       <p:nvPr/>
                     </p:nvPicPr>
                     <p:blipFill>
-                      <a:blip r:embed="rId7"/>
+                      <a:blip r:embed="rId6"/>
                       <a:stretch>
                         <a:fillRect/>
                       </a:stretch>
@@ -5663,7 +5663,7 @@
           <p:cNvSpPr/>
           <p:nvPr userDrawn="1">
             <p:custDataLst>
-              <p:tags r:id="rId5"/>
+              <p:tags r:id="rId4"/>
             </p:custDataLst>
           </p:nvPr>
         </p:nvSpPr>
@@ -6233,7 +6233,7 @@
           </p:cNvGraphicFramePr>
           <p:nvPr userDrawn="1">
             <p:custDataLst>
-              <p:tags r:id="rId4"/>
+              <p:tags r:id="rId3"/>
             </p:custDataLst>
             <p:extLst>
               <p:ext uri="{D42A27DB-BD31-4B8C-83A1-F6EECF244321}">
@@ -6250,12 +6250,12 @@
           <a:graphicData uri="http://schemas.openxmlformats.org/presentationml/2006/ole">
             <mc:AlternateContent xmlns:mc="http://schemas.openxmlformats.org/markup-compatibility/2006">
               <mc:Choice xmlns:v="urn:schemas-microsoft-com:vml" Requires="v">
-                <p:oleObj spid="_x0000_s2055" name="think-cell Slide" r:id="rId6" imgW="395" imgH="396" progId="TCLayout.ActiveDocument.1">
+                <p:oleObj name="think-cell Slide" r:id="rId5" imgW="395" imgH="396" progId="TCLayout.ActiveDocument.1">
                   <p:embed/>
                 </p:oleObj>
               </mc:Choice>
               <mc:Fallback>
-                <p:oleObj name="think-cell Slide" r:id="rId6" imgW="395" imgH="396" progId="TCLayout.ActiveDocument.1">
+                <p:oleObj name="think-cell Slide" r:id="rId5" imgW="395" imgH="396" progId="TCLayout.ActiveDocument.1">
                   <p:embed/>
                   <p:pic>
                     <p:nvPicPr>
@@ -6270,7 +6270,7 @@
                       <p:nvPr/>
                     </p:nvPicPr>
                     <p:blipFill>
-                      <a:blip r:embed="rId7"/>
+                      <a:blip r:embed="rId6"/>
                       <a:stretch>
                         <a:fillRect/>
                       </a:stretch>
@@ -6303,7 +6303,7 @@
           <p:cNvSpPr/>
           <p:nvPr userDrawn="1">
             <p:custDataLst>
-              <p:tags r:id="rId5"/>
+              <p:tags r:id="rId4"/>
             </p:custDataLst>
           </p:nvPr>
         </p:nvSpPr>
@@ -6873,7 +6873,7 @@
           </p:cNvGraphicFramePr>
           <p:nvPr userDrawn="1">
             <p:custDataLst>
-              <p:tags r:id="rId4"/>
+              <p:tags r:id="rId3"/>
             </p:custDataLst>
             <p:extLst>
               <p:ext uri="{D42A27DB-BD31-4B8C-83A1-F6EECF244321}">
@@ -6890,12 +6890,12 @@
           <a:graphicData uri="http://schemas.openxmlformats.org/presentationml/2006/ole">
             <mc:AlternateContent xmlns:mc="http://schemas.openxmlformats.org/markup-compatibility/2006">
               <mc:Choice xmlns:v="urn:schemas-microsoft-com:vml" Requires="v">
-                <p:oleObj spid="_x0000_s3078" name="think-cell Slide" r:id="rId6" imgW="395" imgH="396" progId="TCLayout.ActiveDocument.1">
+                <p:oleObj name="think-cell Slide" r:id="rId5" imgW="395" imgH="396" progId="TCLayout.ActiveDocument.1">
                   <p:embed/>
                 </p:oleObj>
               </mc:Choice>
               <mc:Fallback>
-                <p:oleObj name="think-cell Slide" r:id="rId6" imgW="395" imgH="396" progId="TCLayout.ActiveDocument.1">
+                <p:oleObj name="think-cell Slide" r:id="rId5" imgW="395" imgH="396" progId="TCLayout.ActiveDocument.1">
                   <p:embed/>
                   <p:pic>
                     <p:nvPicPr>
@@ -6910,7 +6910,7 @@
                       <p:nvPr/>
                     </p:nvPicPr>
                     <p:blipFill>
-                      <a:blip r:embed="rId7"/>
+                      <a:blip r:embed="rId6"/>
                       <a:stretch>
                         <a:fillRect/>
                       </a:stretch>
@@ -6943,7 +6943,7 @@
           <p:cNvSpPr/>
           <p:nvPr userDrawn="1">
             <p:custDataLst>
-              <p:tags r:id="rId5"/>
+              <p:tags r:id="rId4"/>
             </p:custDataLst>
           </p:nvPr>
         </p:nvSpPr>
@@ -7507,7 +7507,7 @@
           </p:cNvGraphicFramePr>
           <p:nvPr userDrawn="1">
             <p:custDataLst>
-              <p:tags r:id="rId4"/>
+              <p:tags r:id="rId3"/>
             </p:custDataLst>
             <p:extLst>
               <p:ext uri="{D42A27DB-BD31-4B8C-83A1-F6EECF244321}">
@@ -7524,12 +7524,12 @@
           <a:graphicData uri="http://schemas.openxmlformats.org/presentationml/2006/ole">
             <mc:AlternateContent xmlns:mc="http://schemas.openxmlformats.org/markup-compatibility/2006">
               <mc:Choice xmlns:v="urn:schemas-microsoft-com:vml" Requires="v">
-                <p:oleObj spid="_x0000_s4101" name="think-cell Slide" r:id="rId5" imgW="395" imgH="394" progId="TCLayout.ActiveDocument.1">
+                <p:oleObj name="think-cell Slide" r:id="rId4" imgW="395" imgH="394" progId="TCLayout.ActiveDocument.1">
                   <p:embed/>
                 </p:oleObj>
               </mc:Choice>
               <mc:Fallback>
-                <p:oleObj name="think-cell Slide" r:id="rId5" imgW="395" imgH="394" progId="TCLayout.ActiveDocument.1">
+                <p:oleObj name="think-cell Slide" r:id="rId4" imgW="395" imgH="394" progId="TCLayout.ActiveDocument.1">
                   <p:embed/>
                   <p:pic>
                     <p:nvPicPr>
@@ -7538,7 +7538,7 @@
                       <p:nvPr/>
                     </p:nvPicPr>
                     <p:blipFill>
-                      <a:blip r:embed="rId6"/>
+                      <a:blip r:embed="rId5"/>
                       <a:stretch>
                         <a:fillRect/>
                       </a:stretch>
@@ -7582,7 +7582,7 @@
           </a:ln>
           <a:extLst>
             <a:ext uri="{C572A759-6A51-4108-AA02-DFA0A04FC94B}">
-              <ma14:wrappingTextBoxFlag xmlns="" xmlns:ma14="http://schemas.microsoft.com/office/mac/drawingml/2011/main" val="1"/>
+              <ma14:wrappingTextBoxFlag xmlns:ma14="http://schemas.microsoft.com/office/mac/drawingml/2011/main" xmlns="" val="1"/>
             </a:ext>
           </a:extLst>
         </p:spPr>
@@ -8274,7 +8274,7 @@
           </a:xfrm>
         </p:spPr>
         <p:txBody>
-          <a:bodyPr/>
+          <a:bodyPr anchor="ctr"/>
           <a:lstStyle/>
           <a:p>
             <a:r>

</xml_diff>